<commit_message>
Added left and right button instead of one joystick. Make credits disappear when Sanyi (Player) touch it.
</commit_message>
<xml_diff>
--- a/Documents/presentation_#1.pptx
+++ b/Documents/presentation_#1.pptx
@@ -112,7 +112,57 @@
       </a:defRPr>
     </a:lvl9pPr>
   </p:defaultTextStyle>
+  <p:extLst>
+    <p:ext uri="{EFAFB233-063F-42B5-8137-9DF3F51BA10A}">
+      <p15:sldGuideLst xmlns:p15="http://schemas.microsoft.com/office/powerpoint/2012/main"/>
+    </p:ext>
+  </p:extLst>
 </p:presentation>
+</file>
+
+<file path=ppt/commentAuthors.xml><?xml version="1.0" encoding="utf-8"?>
+<p:cmAuthorLst xmlns:a="http://schemas.openxmlformats.org/drawingml/2006/main" xmlns:r="http://schemas.openxmlformats.org/officeDocument/2006/relationships" xmlns:p="http://schemas.openxmlformats.org/presentationml/2006/main">
+  <p:cmAuthor id="1" name="Gergely Faragó" initials="GF" lastIdx="2" clrIdx="0">
+    <p:extLst>
+      <p:ext uri="{19B8F6BF-5375-455C-9EA6-DF929625EA0E}">
+        <p15:presenceInfo xmlns:p15="http://schemas.microsoft.com/office/powerpoint/2012/main" userId="421dfcc01071552f" providerId="Windows Live"/>
+      </p:ext>
+    </p:extLst>
+  </p:cmAuthor>
+</p:cmAuthorLst>
+</file>
+
+<file path=ppt/comments/comment1.xml><?xml version="1.0" encoding="utf-8"?>
+<p:cmLst xmlns:a="http://schemas.openxmlformats.org/drawingml/2006/main" xmlns:r="http://schemas.openxmlformats.org/officeDocument/2006/relationships" xmlns:p="http://schemas.openxmlformats.org/presentationml/2006/main">
+  <p:cm authorId="1" dt="2019-09-30T07:56:25.959" idx="2">
+    <p:pos x="10" y="10"/>
+    <p:text>Miért ezt választottuk?
+- Volt némi ismeretünk benne
+- Barátságos környezet
+- Viszonylag könnyű kezelés
+- Kezdőknek könyű elindulni benne
+- INGYENES!</p:text>
+    <p:extLst>
+      <p:ext uri="{C676402C-5697-4E1C-873F-D02D1690AC5C}">
+        <p15:threadingInfo xmlns:p15="http://schemas.microsoft.com/office/powerpoint/2012/main" timeZoneBias="-120"/>
+      </p:ext>
+    </p:extLst>
+  </p:cm>
+</p:cmLst>
+</file>
+
+<file path=ppt/comments/comment2.xml><?xml version="1.0" encoding="utf-8"?>
+<p:cmLst xmlns:a="http://schemas.openxmlformats.org/drawingml/2006/main" xmlns:r="http://schemas.openxmlformats.org/officeDocument/2006/relationships" xmlns:p="http://schemas.openxmlformats.org/presentationml/2006/main">
+  <p:cm authorId="1" dt="2019-09-30T07:54:03.654" idx="1">
+    <p:pos x="10" y="10"/>
+    <p:text>A játék az egyetem I épületében játszódik. Karakterünk egy kezdő hallgató kolléga, aki a tanterv szerint tárgyakat vesz fel, és ennek megfelelően gyűjti a kreditjeit, aláírásait. Ahogy jutunk át a féléveken,  bizonyíthatjuk tudásunkat a tárgyaknak megfelelő kérdések megválaszolásával.</p:text>
+    <p:extLst>
+      <p:ext uri="{C676402C-5697-4E1C-873F-D02D1690AC5C}">
+        <p15:threadingInfo xmlns:p15="http://schemas.microsoft.com/office/powerpoint/2012/main" timeZoneBias="-120"/>
+      </p:ext>
+    </p:extLst>
+  </p:cm>
+</p:cmLst>
 </file>
 
 <file path=ppt/slideLayouts/slideLayout1.xml><?xml version="1.0" encoding="utf-8"?>
@@ -840,7 +890,7 @@
             <a:fld id="{B61BEF0D-F0BB-DE4B-95CE-6DB70DBA9567}" type="datetimeFigureOut">
               <a:rPr lang="en-US" dirty="0"/>
               <a:pPr/>
-              <a:t>9/28/2019</a:t>
+              <a:t>9/30/2019</a:t>
             </a:fld>
             <a:endParaRPr lang="en-US" dirty="0"/>
           </a:p>
@@ -1088,7 +1138,7 @@
             <a:fld id="{B61BEF0D-F0BB-DE4B-95CE-6DB70DBA9567}" type="datetimeFigureOut">
               <a:rPr lang="en-US" dirty="0"/>
               <a:pPr/>
-              <a:t>9/28/2019</a:t>
+              <a:t>9/30/2019</a:t>
             </a:fld>
             <a:endParaRPr lang="en-US" dirty="0"/>
           </a:p>
@@ -1399,7 +1449,7 @@
             <a:fld id="{B61BEF0D-F0BB-DE4B-95CE-6DB70DBA9567}" type="datetimeFigureOut">
               <a:rPr lang="en-US" dirty="0"/>
               <a:pPr/>
-              <a:t>9/28/2019</a:t>
+              <a:t>9/30/2019</a:t>
             </a:fld>
             <a:endParaRPr lang="en-US" dirty="0"/>
           </a:p>
@@ -1723,7 +1773,7 @@
             <a:fld id="{B61BEF0D-F0BB-DE4B-95CE-6DB70DBA9567}" type="datetimeFigureOut">
               <a:rPr lang="en-US" dirty="0"/>
               <a:pPr/>
-              <a:t>9/28/2019</a:t>
+              <a:t>9/30/2019</a:t>
             </a:fld>
             <a:endParaRPr lang="en-US" dirty="0"/>
           </a:p>
@@ -2034,7 +2084,7 @@
             <a:fld id="{B61BEF0D-F0BB-DE4B-95CE-6DB70DBA9567}" type="datetimeFigureOut">
               <a:rPr lang="en-US" dirty="0"/>
               <a:pPr/>
-              <a:t>9/28/2019</a:t>
+              <a:t>9/30/2019</a:t>
             </a:fld>
             <a:endParaRPr lang="en-US" dirty="0"/>
           </a:p>
@@ -2418,7 +2468,7 @@
             <a:fld id="{B61BEF0D-F0BB-DE4B-95CE-6DB70DBA9567}" type="datetimeFigureOut">
               <a:rPr lang="en-US" dirty="0"/>
               <a:pPr/>
-              <a:t>9/28/2019</a:t>
+              <a:t>9/30/2019</a:t>
             </a:fld>
             <a:endParaRPr lang="en-US" dirty="0"/>
           </a:p>
@@ -2584,7 +2634,7 @@
           <a:p>
             <a:fld id="{55C6B4A9-1611-4792-9094-5F34BCA07E0B}" type="datetimeFigureOut">
               <a:rPr lang="en-US" dirty="0"/>
-              <a:t>9/28/2019</a:t>
+              <a:t>9/30/2019</a:t>
             </a:fld>
             <a:endParaRPr lang="en-US" dirty="0"/>
           </a:p>
@@ -2760,7 +2810,7 @@
             <a:fld id="{B61BEF0D-F0BB-DE4B-95CE-6DB70DBA9567}" type="datetimeFigureOut">
               <a:rPr lang="en-US" dirty="0"/>
               <a:pPr/>
-              <a:t>9/28/2019</a:t>
+              <a:t>9/30/2019</a:t>
             </a:fld>
             <a:endParaRPr lang="en-US" dirty="0"/>
           </a:p>
@@ -2933,7 +2983,7 @@
             <a:fld id="{B61BEF0D-F0BB-DE4B-95CE-6DB70DBA9567}" type="datetimeFigureOut">
               <a:rPr lang="en-US" dirty="0"/>
               <a:pPr/>
-              <a:t>9/28/2019</a:t>
+              <a:t>9/30/2019</a:t>
             </a:fld>
             <a:endParaRPr lang="en-US" dirty="0"/>
           </a:p>
@@ -3177,7 +3227,7 @@
             <a:fld id="{B61BEF0D-F0BB-DE4B-95CE-6DB70DBA9567}" type="datetimeFigureOut">
               <a:rPr lang="en-US" dirty="0"/>
               <a:pPr/>
-              <a:t>9/28/2019</a:t>
+              <a:t>9/30/2019</a:t>
             </a:fld>
             <a:endParaRPr lang="en-US" dirty="0"/>
           </a:p>
@@ -3405,7 +3455,7 @@
           <a:p>
             <a:fld id="{EB712588-04B1-427B-82EE-E8DB90309F08}" type="datetimeFigureOut">
               <a:rPr lang="en-US" dirty="0"/>
-              <a:t>9/28/2019</a:t>
+              <a:t>9/30/2019</a:t>
             </a:fld>
             <a:endParaRPr lang="en-US" dirty="0"/>
           </a:p>
@@ -3775,7 +3825,7 @@
             <a:fld id="{B61BEF0D-F0BB-DE4B-95CE-6DB70DBA9567}" type="datetimeFigureOut">
               <a:rPr lang="en-US" dirty="0"/>
               <a:pPr/>
-              <a:t>9/28/2019</a:t>
+              <a:t>9/30/2019</a:t>
             </a:fld>
             <a:endParaRPr lang="en-US" dirty="0"/>
           </a:p>
@@ -3895,7 +3945,7 @@
             <a:fld id="{B61BEF0D-F0BB-DE4B-95CE-6DB70DBA9567}" type="datetimeFigureOut">
               <a:rPr lang="en-US" dirty="0"/>
               <a:pPr/>
-              <a:t>9/28/2019</a:t>
+              <a:t>9/30/2019</a:t>
             </a:fld>
             <a:endParaRPr lang="en-US" dirty="0"/>
           </a:p>
@@ -3987,7 +4037,7 @@
             <a:fld id="{B61BEF0D-F0BB-DE4B-95CE-6DB70DBA9567}" type="datetimeFigureOut">
               <a:rPr lang="en-US" dirty="0"/>
               <a:pPr/>
-              <a:t>9/28/2019</a:t>
+              <a:t>9/30/2019</a:t>
             </a:fld>
             <a:endParaRPr lang="en-US" dirty="0"/>
           </a:p>
@@ -4238,7 +4288,7 @@
           <a:p>
             <a:fld id="{42A54C80-263E-416B-A8E0-580EDEADCBDC}" type="datetimeFigureOut">
               <a:rPr lang="en-US" dirty="0"/>
-              <a:t>9/28/2019</a:t>
+              <a:t>9/30/2019</a:t>
             </a:fld>
             <a:endParaRPr lang="en-US" dirty="0"/>
           </a:p>
@@ -4497,7 +4547,7 @@
             <a:fld id="{B61BEF0D-F0BB-DE4B-95CE-6DB70DBA9567}" type="datetimeFigureOut">
               <a:rPr lang="en-US" dirty="0"/>
               <a:pPr/>
-              <a:t>9/28/2019</a:t>
+              <a:t>9/30/2019</a:t>
             </a:fld>
             <a:endParaRPr lang="en-US" dirty="0"/>
           </a:p>
@@ -5239,7 +5289,7 @@
             <a:fld id="{B61BEF0D-F0BB-DE4B-95CE-6DB70DBA9567}" type="datetimeFigureOut">
               <a:rPr lang="en-US" dirty="0"/>
               <a:pPr/>
-              <a:t>9/28/2019</a:t>
+              <a:t>9/30/2019</a:t>
             </a:fld>
             <a:endParaRPr lang="en-US" dirty="0"/>
           </a:p>
@@ -5799,7 +5849,7 @@
         </p:nvSpPr>
         <p:spPr>
           <a:xfrm>
-            <a:off x="1507067" y="2748905"/>
+            <a:off x="1507067" y="2768465"/>
             <a:ext cx="7766936" cy="1096899"/>
           </a:xfrm>
         </p:spPr>
@@ -5810,9 +5860,267 @@
           <a:lstStyle/>
           <a:p>
             <a:r>
-              <a:rPr lang="hu-HU" sz="2800" dirty="0"/>
+              <a:rPr lang="hu-HU" sz="4000" dirty="0" smtClean="0">
+                <a:solidFill>
+                  <a:schemeClr val="accent1"/>
+                </a:solidFill>
+              </a:rPr>
+              <a:t>Bad Boyz</a:t>
+            </a:r>
+            <a:endParaRPr lang="hu-HU" sz="4000" dirty="0">
+              <a:solidFill>
+                <a:schemeClr val="accent1"/>
+              </a:solidFill>
+            </a:endParaRPr>
+          </a:p>
+        </p:txBody>
+      </p:sp>
+      <p:sp>
+        <p:nvSpPr>
+          <p:cNvPr id="4" name="Alcím 2"/>
+          <p:cNvSpPr txBox="1">
+            <a:spLocks/>
+          </p:cNvSpPr>
+          <p:nvPr/>
+        </p:nvSpPr>
+        <p:spPr>
+          <a:xfrm>
+            <a:off x="1507067" y="3879164"/>
+            <a:ext cx="7766936" cy="1096899"/>
+          </a:xfrm>
+          <a:prstGeom prst="rect">
+            <a:avLst/>
+          </a:prstGeom>
+        </p:spPr>
+        <p:txBody>
+          <a:bodyPr vert="horz" lIns="91440" tIns="45720" rIns="91440" bIns="45720" rtlCol="0" anchor="t">
+            <a:normAutofit/>
+          </a:bodyPr>
+          <a:lstStyle>
+            <a:lvl1pPr marL="0" indent="0" algn="r" defTabSz="457200" rtl="0" eaLnBrk="1" latinLnBrk="0" hangingPunct="1">
+              <a:spcBef>
+                <a:spcPts val="1000"/>
+              </a:spcBef>
+              <a:spcAft>
+                <a:spcPts val="0"/>
+              </a:spcAft>
+              <a:buClr>
+                <a:schemeClr val="accent1"/>
+              </a:buClr>
+              <a:buSzPct val="80000"/>
+              <a:buFont typeface="Wingdings 3" charset="2"/>
+              <a:buNone/>
+              <a:defRPr sz="1800" kern="1200">
+                <a:solidFill>
+                  <a:schemeClr val="tx1">
+                    <a:lumMod val="50000"/>
+                    <a:lumOff val="50000"/>
+                  </a:schemeClr>
+                </a:solidFill>
+                <a:latin typeface="+mn-lt"/>
+                <a:ea typeface="+mn-ea"/>
+                <a:cs typeface="+mn-cs"/>
+              </a:defRPr>
+            </a:lvl1pPr>
+            <a:lvl2pPr marL="457200" indent="0" algn="ctr" defTabSz="457200" rtl="0" eaLnBrk="1" latinLnBrk="0" hangingPunct="1">
+              <a:spcBef>
+                <a:spcPts val="1000"/>
+              </a:spcBef>
+              <a:spcAft>
+                <a:spcPts val="0"/>
+              </a:spcAft>
+              <a:buClr>
+                <a:schemeClr val="accent1"/>
+              </a:buClr>
+              <a:buSzPct val="80000"/>
+              <a:buFont typeface="Wingdings 3" charset="2"/>
+              <a:buNone/>
+              <a:defRPr sz="1600" kern="1200">
+                <a:solidFill>
+                  <a:schemeClr val="tx1">
+                    <a:tint val="75000"/>
+                  </a:schemeClr>
+                </a:solidFill>
+                <a:latin typeface="+mn-lt"/>
+                <a:ea typeface="+mn-ea"/>
+                <a:cs typeface="+mn-cs"/>
+              </a:defRPr>
+            </a:lvl2pPr>
+            <a:lvl3pPr marL="914400" indent="0" algn="ctr" defTabSz="457200" rtl="0" eaLnBrk="1" latinLnBrk="0" hangingPunct="1">
+              <a:spcBef>
+                <a:spcPts val="1000"/>
+              </a:spcBef>
+              <a:spcAft>
+                <a:spcPts val="0"/>
+              </a:spcAft>
+              <a:buClr>
+                <a:schemeClr val="accent1"/>
+              </a:buClr>
+              <a:buSzPct val="80000"/>
+              <a:buFont typeface="Wingdings 3" charset="2"/>
+              <a:buNone/>
+              <a:defRPr sz="1400" kern="1200">
+                <a:solidFill>
+                  <a:schemeClr val="tx1">
+                    <a:tint val="75000"/>
+                  </a:schemeClr>
+                </a:solidFill>
+                <a:latin typeface="+mn-lt"/>
+                <a:ea typeface="+mn-ea"/>
+                <a:cs typeface="+mn-cs"/>
+              </a:defRPr>
+            </a:lvl3pPr>
+            <a:lvl4pPr marL="1371600" indent="0" algn="ctr" defTabSz="457200" rtl="0" eaLnBrk="1" latinLnBrk="0" hangingPunct="1">
+              <a:spcBef>
+                <a:spcPts val="1000"/>
+              </a:spcBef>
+              <a:spcAft>
+                <a:spcPts val="0"/>
+              </a:spcAft>
+              <a:buClr>
+                <a:schemeClr val="accent1"/>
+              </a:buClr>
+              <a:buSzPct val="80000"/>
+              <a:buFont typeface="Wingdings 3" charset="2"/>
+              <a:buNone/>
+              <a:defRPr sz="1200" kern="1200">
+                <a:solidFill>
+                  <a:schemeClr val="tx1">
+                    <a:tint val="75000"/>
+                  </a:schemeClr>
+                </a:solidFill>
+                <a:latin typeface="+mn-lt"/>
+                <a:ea typeface="+mn-ea"/>
+                <a:cs typeface="+mn-cs"/>
+              </a:defRPr>
+            </a:lvl4pPr>
+            <a:lvl5pPr marL="1828800" indent="0" algn="ctr" defTabSz="457200" rtl="0" eaLnBrk="1" latinLnBrk="0" hangingPunct="1">
+              <a:spcBef>
+                <a:spcPts val="1000"/>
+              </a:spcBef>
+              <a:spcAft>
+                <a:spcPts val="0"/>
+              </a:spcAft>
+              <a:buClr>
+                <a:schemeClr val="accent1"/>
+              </a:buClr>
+              <a:buSzPct val="80000"/>
+              <a:buFont typeface="Wingdings 3" charset="2"/>
+              <a:buNone/>
+              <a:defRPr sz="1200" kern="1200">
+                <a:solidFill>
+                  <a:schemeClr val="tx1">
+                    <a:tint val="75000"/>
+                  </a:schemeClr>
+                </a:solidFill>
+                <a:latin typeface="+mn-lt"/>
+                <a:ea typeface="+mn-ea"/>
+                <a:cs typeface="+mn-cs"/>
+              </a:defRPr>
+            </a:lvl5pPr>
+            <a:lvl6pPr marL="2286000" indent="0" algn="ctr" defTabSz="457200" rtl="0" eaLnBrk="1" latinLnBrk="0" hangingPunct="1">
+              <a:spcBef>
+                <a:spcPts val="1000"/>
+              </a:spcBef>
+              <a:spcAft>
+                <a:spcPts val="0"/>
+              </a:spcAft>
+              <a:buClr>
+                <a:schemeClr val="accent1"/>
+              </a:buClr>
+              <a:buSzPct val="80000"/>
+              <a:buFont typeface="Wingdings 3" charset="2"/>
+              <a:buNone/>
+              <a:defRPr sz="1200" kern="1200">
+                <a:solidFill>
+                  <a:schemeClr val="tx1">
+                    <a:tint val="75000"/>
+                  </a:schemeClr>
+                </a:solidFill>
+                <a:latin typeface="+mn-lt"/>
+                <a:ea typeface="+mn-ea"/>
+                <a:cs typeface="+mn-cs"/>
+              </a:defRPr>
+            </a:lvl6pPr>
+            <a:lvl7pPr marL="2743200" indent="0" algn="ctr" defTabSz="457200" rtl="0" eaLnBrk="1" latinLnBrk="0" hangingPunct="1">
+              <a:spcBef>
+                <a:spcPts val="1000"/>
+              </a:spcBef>
+              <a:spcAft>
+                <a:spcPts val="0"/>
+              </a:spcAft>
+              <a:buClr>
+                <a:schemeClr val="accent1"/>
+              </a:buClr>
+              <a:buSzPct val="80000"/>
+              <a:buFont typeface="Wingdings 3" charset="2"/>
+              <a:buNone/>
+              <a:defRPr sz="1200" kern="1200">
+                <a:solidFill>
+                  <a:schemeClr val="tx1">
+                    <a:tint val="75000"/>
+                  </a:schemeClr>
+                </a:solidFill>
+                <a:latin typeface="+mn-lt"/>
+                <a:ea typeface="+mn-ea"/>
+                <a:cs typeface="+mn-cs"/>
+              </a:defRPr>
+            </a:lvl7pPr>
+            <a:lvl8pPr marL="3200400" indent="0" algn="ctr" defTabSz="457200" rtl="0" eaLnBrk="1" latinLnBrk="0" hangingPunct="1">
+              <a:spcBef>
+                <a:spcPts val="1000"/>
+              </a:spcBef>
+              <a:spcAft>
+                <a:spcPts val="0"/>
+              </a:spcAft>
+              <a:buClr>
+                <a:schemeClr val="accent1"/>
+              </a:buClr>
+              <a:buSzPct val="80000"/>
+              <a:buFont typeface="Wingdings 3" charset="2"/>
+              <a:buNone/>
+              <a:defRPr sz="1200" kern="1200">
+                <a:solidFill>
+                  <a:schemeClr val="tx1">
+                    <a:tint val="75000"/>
+                  </a:schemeClr>
+                </a:solidFill>
+                <a:latin typeface="+mn-lt"/>
+                <a:ea typeface="+mn-ea"/>
+                <a:cs typeface="+mn-cs"/>
+              </a:defRPr>
+            </a:lvl8pPr>
+            <a:lvl9pPr marL="3657600" indent="0" algn="ctr" defTabSz="457200" rtl="0" eaLnBrk="1" latinLnBrk="0" hangingPunct="1">
+              <a:spcBef>
+                <a:spcPts val="1000"/>
+              </a:spcBef>
+              <a:spcAft>
+                <a:spcPts val="0"/>
+              </a:spcAft>
+              <a:buClr>
+                <a:schemeClr val="accent1"/>
+              </a:buClr>
+              <a:buSzPct val="80000"/>
+              <a:buFont typeface="Wingdings 3" charset="2"/>
+              <a:buNone/>
+              <a:defRPr sz="1200" kern="1200">
+                <a:solidFill>
+                  <a:schemeClr val="tx1">
+                    <a:tint val="75000"/>
+                  </a:schemeClr>
+                </a:solidFill>
+                <a:latin typeface="+mn-lt"/>
+                <a:ea typeface="+mn-ea"/>
+                <a:cs typeface="+mn-cs"/>
+              </a:defRPr>
+            </a:lvl9pPr>
+          </a:lstStyle>
+          <a:p>
+            <a:r>
+              <a:rPr lang="hu-HU" sz="2800" dirty="0" smtClean="0"/>
               <a:t>Ultimate Credit Collecting</a:t>
             </a:r>
+            <a:endParaRPr lang="hu-HU" sz="2800" dirty="0"/>
           </a:p>
         </p:txBody>
       </p:sp>

</xml_diff>